<commit_message>
Corrections for presentation and dataset_generator
</commit_message>
<xml_diff>
--- a/l-diversity.pptx
+++ b/l-diversity.pptx
@@ -24860,7 +24860,7 @@
             </a:pPr>
             <a:r>
               <a:rPr lang="en" sz="1400" dirty="0"/>
-              <a:t>       - efficiency and complexity</a:t>
+              <a:t>       - performance and efficiency</a:t>
             </a:r>
           </a:p>
           <a:p>
@@ -29934,7 +29934,7 @@
                 </a:solidFill>
                 <a:latin typeface="Maven Pro" panose="020B0604020202020204" charset="0"/>
               </a:rPr>
-              <a:t> set to 1000 </a:t>
+              <a:t> set to 10000 </a:t>
             </a:r>
             <a:r>
               <a:rPr lang="it-IT" dirty="0" err="1">

</xml_diff>

<commit_message>
Minor corrections to PowerPoint presentation
</commit_message>
<xml_diff>
--- a/l-diversity.pptx
+++ b/l-diversity.pptx
@@ -33074,22 +33074,13 @@
               <a:t> are </a:t>
             </a:r>
             <a:r>
-              <a:rPr lang="it-IT" dirty="0" err="1">
+              <a:rPr lang="it-IT">
                 <a:solidFill>
                   <a:schemeClr val="bg1"/>
                 </a:solidFill>
                 <a:latin typeface="Maven Pro" panose="020B0604020202020204" charset="0"/>
               </a:rPr>
-              <a:t>anonymized</a:t>
-            </a:r>
-            <a:r>
-              <a:rPr lang="it-IT" dirty="0">
-                <a:solidFill>
-                  <a:schemeClr val="bg1"/>
-                </a:solidFill>
-                <a:latin typeface="Maven Pro" panose="020B0604020202020204" charset="0"/>
-              </a:rPr>
-              <a:t> </a:t>
+              <a:t>generalized </a:t>
             </a:r>
             <a:r>
               <a:rPr lang="it-IT" dirty="0" err="1">

</xml_diff>